<commit_message>
Updated Communities overview image
Updated the Powerpoint and image for the Communities overview
</commit_message>
<xml_diff>
--- a/wiki-resources/code-tables.pptx
+++ b/wiki-resources/code-tables.pptx
@@ -203,7 +203,7 @@
           <a:p>
             <a:fld id="{2EDC9193-A387-CB4E-AEF4-975C238A39CA}" type="datetimeFigureOut">
               <a:rPr lang="en-US" smtClean="0"/>
-              <a:t>6/4/25</a:t>
+              <a:t>6/12/25</a:t>
             </a:fld>
             <a:endParaRPr lang="en-US"/>
           </a:p>
@@ -690,7 +690,7 @@
           <a:p>
             <a:fld id="{FBD5CA2A-893C-1249-BC34-A66497B3736E}" type="datetimeFigureOut">
               <a:rPr lang="en-US" smtClean="0"/>
-              <a:t>6/4/25</a:t>
+              <a:t>6/12/25</a:t>
             </a:fld>
             <a:endParaRPr lang="en-US"/>
           </a:p>
@@ -860,7 +860,7 @@
           <a:p>
             <a:fld id="{FBD5CA2A-893C-1249-BC34-A66497B3736E}" type="datetimeFigureOut">
               <a:rPr lang="en-US" smtClean="0"/>
-              <a:t>6/4/25</a:t>
+              <a:t>6/12/25</a:t>
             </a:fld>
             <a:endParaRPr lang="en-US"/>
           </a:p>
@@ -1040,7 +1040,7 @@
           <a:p>
             <a:fld id="{FBD5CA2A-893C-1249-BC34-A66497B3736E}" type="datetimeFigureOut">
               <a:rPr lang="en-US" smtClean="0"/>
-              <a:t>6/4/25</a:t>
+              <a:t>6/12/25</a:t>
             </a:fld>
             <a:endParaRPr lang="en-US"/>
           </a:p>
@@ -1210,7 +1210,7 @@
           <a:p>
             <a:fld id="{FBD5CA2A-893C-1249-BC34-A66497B3736E}" type="datetimeFigureOut">
               <a:rPr lang="en-US" smtClean="0"/>
-              <a:t>6/4/25</a:t>
+              <a:t>6/12/25</a:t>
             </a:fld>
             <a:endParaRPr lang="en-US"/>
           </a:p>
@@ -1456,7 +1456,7 @@
           <a:p>
             <a:fld id="{FBD5CA2A-893C-1249-BC34-A66497B3736E}" type="datetimeFigureOut">
               <a:rPr lang="en-US" smtClean="0"/>
-              <a:t>6/4/25</a:t>
+              <a:t>6/12/25</a:t>
             </a:fld>
             <a:endParaRPr lang="en-US"/>
           </a:p>
@@ -1688,7 +1688,7 @@
           <a:p>
             <a:fld id="{FBD5CA2A-893C-1249-BC34-A66497B3736E}" type="datetimeFigureOut">
               <a:rPr lang="en-US" smtClean="0"/>
-              <a:t>6/4/25</a:t>
+              <a:t>6/12/25</a:t>
             </a:fld>
             <a:endParaRPr lang="en-US"/>
           </a:p>
@@ -2055,7 +2055,7 @@
           <a:p>
             <a:fld id="{FBD5CA2A-893C-1249-BC34-A66497B3736E}" type="datetimeFigureOut">
               <a:rPr lang="en-US" smtClean="0"/>
-              <a:t>6/4/25</a:t>
+              <a:t>6/12/25</a:t>
             </a:fld>
             <a:endParaRPr lang="en-US"/>
           </a:p>
@@ -2173,7 +2173,7 @@
           <a:p>
             <a:fld id="{FBD5CA2A-893C-1249-BC34-A66497B3736E}" type="datetimeFigureOut">
               <a:rPr lang="en-US" smtClean="0"/>
-              <a:t>6/4/25</a:t>
+              <a:t>6/12/25</a:t>
             </a:fld>
             <a:endParaRPr lang="en-US"/>
           </a:p>
@@ -2268,7 +2268,7 @@
           <a:p>
             <a:fld id="{FBD5CA2A-893C-1249-BC34-A66497B3736E}" type="datetimeFigureOut">
               <a:rPr lang="en-US" smtClean="0"/>
-              <a:t>6/4/25</a:t>
+              <a:t>6/12/25</a:t>
             </a:fld>
             <a:endParaRPr lang="en-US"/>
           </a:p>
@@ -2545,7 +2545,7 @@
           <a:p>
             <a:fld id="{FBD5CA2A-893C-1249-BC34-A66497B3736E}" type="datetimeFigureOut">
               <a:rPr lang="en-US" smtClean="0"/>
-              <a:t>6/4/25</a:t>
+              <a:t>6/12/25</a:t>
             </a:fld>
             <a:endParaRPr lang="en-US"/>
           </a:p>
@@ -2802,7 +2802,7 @@
           <a:p>
             <a:fld id="{FBD5CA2A-893C-1249-BC34-A66497B3736E}" type="datetimeFigureOut">
               <a:rPr lang="en-US" smtClean="0"/>
-              <a:t>6/4/25</a:t>
+              <a:t>6/12/25</a:t>
             </a:fld>
             <a:endParaRPr lang="en-US"/>
           </a:p>
@@ -3015,7 +3015,7 @@
           <a:p>
             <a:fld id="{FBD5CA2A-893C-1249-BC34-A66497B3736E}" type="datetimeFigureOut">
               <a:rPr lang="en-US" smtClean="0"/>
-              <a:t>6/4/25</a:t>
+              <a:t>6/12/25</a:t>
             </a:fld>
             <a:endParaRPr lang="en-US"/>
           </a:p>
@@ -7283,7 +7283,7 @@
           <p:nvPr>
             <p:extLst>
               <p:ext uri="{D42A27DB-BD31-4B8C-83A1-F6EECF244321}">
-                <p14:modId xmlns:p14="http://schemas.microsoft.com/office/powerpoint/2010/main" val="1741355964"/>
+                <p14:modId xmlns:p14="http://schemas.microsoft.com/office/powerpoint/2010/main" val="2692430615"/>
               </p:ext>
             </p:extLst>
           </p:nvPr>
@@ -8326,7 +8326,7 @@
                           <a:latin typeface="Roboto" panose="02000000000000000000" pitchFamily="2" charset="0"/>
                           <a:ea typeface="Roboto" panose="02000000000000000000" pitchFamily="2" charset="0"/>
                         </a:rPr>
-                        <a:t>Specified</a:t>
+                        <a:t>Other-Specified</a:t>
                       </a:r>
                     </a:p>
                   </a:txBody>
@@ -8356,7 +8356,7 @@
                           <a:latin typeface="Roboto" panose="02000000000000000000" pitchFamily="2" charset="0"/>
                           <a:ea typeface="Roboto" panose="02000000000000000000" pitchFamily="2" charset="0"/>
                         </a:rPr>
-                        <a:t>Unspecified</a:t>
+                        <a:t>Other-Unspecified</a:t>
                       </a:r>
                       <a:endParaRPr lang="en-US" sz="1100" b="1" u="sng" dirty="0">
                         <a:latin typeface="Roboto" panose="02000000000000000000" pitchFamily="2" charset="0"/>

</xml_diff>